<commit_message>
EP y UI - Ingresar Reserva
</commit_message>
<xml_diff>
--- a/PPT.pptx
+++ b/PPT.pptx
@@ -27,6 +27,11 @@
     <p:sldId id="277" r:id="rId21"/>
     <p:sldId id="278" r:id="rId22"/>
     <p:sldId id="279" r:id="rId23"/>
+    <p:sldId id="280" r:id="rId24"/>
+    <p:sldId id="281" r:id="rId25"/>
+    <p:sldId id="282" r:id="rId26"/>
+    <p:sldId id="283" r:id="rId27"/>
+    <p:sldId id="285" r:id="rId28"/>
   </p:sldIdLst>
   <p:sldSz cx="12192000" cy="6858000"/>
   <p:notesSz cx="6858000" cy="9144000"/>
@@ -127,7 +132,18 @@
   </p:defaultTextStyle>
   <p:extLst>
     <p:ext uri="{EFAFB233-063F-42B5-8137-9DF3F51BA10A}">
-      <p15:sldGuideLst xmlns:p15="http://schemas.microsoft.com/office/powerpoint/2012/main" xmlns=""/>
+      <p15:sldGuideLst xmlns:p15="http://schemas.microsoft.com/office/powerpoint/2012/main">
+        <p15:guide id="1" orient="horz" pos="2160">
+          <p15:clr>
+            <a:srgbClr val="A4A3A4"/>
+          </p15:clr>
+        </p15:guide>
+        <p15:guide id="2" pos="3840">
+          <p15:clr>
+            <a:srgbClr val="A4A3A4"/>
+          </p15:clr>
+        </p15:guide>
+      </p15:sldGuideLst>
     </p:ext>
   </p:extLst>
 </p:presentation>
@@ -12919,14 +12935,14 @@
                 <a:gridCol w="2299119">
                   <a:extLst>
                     <a:ext uri="{9D8B030D-6E8A-4147-A177-3AD203B41FA5}">
-                      <a16:colId xmlns:a16="http://schemas.microsoft.com/office/drawing/2014/main" xmlns="" val="884427282"/>
+                      <a16:colId xmlns="" xmlns:a16="http://schemas.microsoft.com/office/drawing/2014/main" val="884427282"/>
                     </a:ext>
                   </a:extLst>
                 </a:gridCol>
                 <a:gridCol w="6669784">
                   <a:extLst>
                     <a:ext uri="{9D8B030D-6E8A-4147-A177-3AD203B41FA5}">
-                      <a16:colId xmlns:a16="http://schemas.microsoft.com/office/drawing/2014/main" xmlns="" val="1965136843"/>
+                      <a16:colId xmlns="" xmlns:a16="http://schemas.microsoft.com/office/drawing/2014/main" val="1965136843"/>
                     </a:ext>
                   </a:extLst>
                 </a:gridCol>
@@ -13023,7 +13039,7 @@
                 </a:tc>
                 <a:extLst>
                   <a:ext uri="{0D108BD9-81ED-4DB2-BD59-A6C34878D82A}">
-                    <a16:rowId xmlns:a16="http://schemas.microsoft.com/office/drawing/2014/main" xmlns="" val="3337214981"/>
+                    <a16:rowId xmlns="" xmlns:a16="http://schemas.microsoft.com/office/drawing/2014/main" val="3337214981"/>
                   </a:ext>
                 </a:extLst>
               </a:tr>
@@ -13088,7 +13104,7 @@
                 </a:tc>
                 <a:extLst>
                   <a:ext uri="{0D108BD9-81ED-4DB2-BD59-A6C34878D82A}">
-                    <a16:rowId xmlns:a16="http://schemas.microsoft.com/office/drawing/2014/main" xmlns="" val="1042998721"/>
+                    <a16:rowId xmlns="" xmlns:a16="http://schemas.microsoft.com/office/drawing/2014/main" val="1042998721"/>
                   </a:ext>
                 </a:extLst>
               </a:tr>
@@ -13172,7 +13188,7 @@
                 </a:tc>
                 <a:extLst>
                   <a:ext uri="{0D108BD9-81ED-4DB2-BD59-A6C34878D82A}">
-                    <a16:rowId xmlns:a16="http://schemas.microsoft.com/office/drawing/2014/main" xmlns="" val="3300350946"/>
+                    <a16:rowId xmlns="" xmlns:a16="http://schemas.microsoft.com/office/drawing/2014/main" val="3300350946"/>
                   </a:ext>
                 </a:extLst>
               </a:tr>
@@ -13237,7 +13253,7 @@
                 </a:tc>
                 <a:extLst>
                   <a:ext uri="{0D108BD9-81ED-4DB2-BD59-A6C34878D82A}">
-                    <a16:rowId xmlns:a16="http://schemas.microsoft.com/office/drawing/2014/main" xmlns="" val="1102406645"/>
+                    <a16:rowId xmlns="" xmlns:a16="http://schemas.microsoft.com/office/drawing/2014/main" val="1102406645"/>
                   </a:ext>
                 </a:extLst>
               </a:tr>
@@ -13302,7 +13318,7 @@
                 </a:tc>
                 <a:extLst>
                   <a:ext uri="{0D108BD9-81ED-4DB2-BD59-A6C34878D82A}">
-                    <a16:rowId xmlns:a16="http://schemas.microsoft.com/office/drawing/2014/main" xmlns="" val="2580220237"/>
+                    <a16:rowId xmlns="" xmlns:a16="http://schemas.microsoft.com/office/drawing/2014/main" val="2580220237"/>
                   </a:ext>
                 </a:extLst>
               </a:tr>
@@ -13386,7 +13402,7 @@
                 </a:tc>
                 <a:extLst>
                   <a:ext uri="{0D108BD9-81ED-4DB2-BD59-A6C34878D82A}">
-                    <a16:rowId xmlns:a16="http://schemas.microsoft.com/office/drawing/2014/main" xmlns="" val="1814964967"/>
+                    <a16:rowId xmlns="" xmlns:a16="http://schemas.microsoft.com/office/drawing/2014/main" val="1814964967"/>
                   </a:ext>
                 </a:extLst>
               </a:tr>
@@ -13451,7 +13467,7 @@
                 </a:tc>
                 <a:extLst>
                   <a:ext uri="{0D108BD9-81ED-4DB2-BD59-A6C34878D82A}">
-                    <a16:rowId xmlns:a16="http://schemas.microsoft.com/office/drawing/2014/main" xmlns="" val="1296452611"/>
+                    <a16:rowId xmlns="" xmlns:a16="http://schemas.microsoft.com/office/drawing/2014/main" val="1296452611"/>
                   </a:ext>
                 </a:extLst>
               </a:tr>
@@ -13528,7 +13544,7 @@
                 </a:tc>
                 <a:extLst>
                   <a:ext uri="{0D108BD9-81ED-4DB2-BD59-A6C34878D82A}">
-                    <a16:rowId xmlns:a16="http://schemas.microsoft.com/office/drawing/2014/main" xmlns="" val="4085416620"/>
+                    <a16:rowId xmlns="" xmlns:a16="http://schemas.microsoft.com/office/drawing/2014/main" val="4085416620"/>
                   </a:ext>
                 </a:extLst>
               </a:tr>
@@ -13622,14 +13638,14 @@
                 <a:gridCol w="2339017">
                   <a:extLst>
                     <a:ext uri="{9D8B030D-6E8A-4147-A177-3AD203B41FA5}">
-                      <a16:colId xmlns:a16="http://schemas.microsoft.com/office/drawing/2014/main" xmlns="" val="3482930360"/>
+                      <a16:colId xmlns="" xmlns:a16="http://schemas.microsoft.com/office/drawing/2014/main" val="3482930360"/>
                     </a:ext>
                   </a:extLst>
                 </a:gridCol>
                 <a:gridCol w="6785527">
                   <a:extLst>
                     <a:ext uri="{9D8B030D-6E8A-4147-A177-3AD203B41FA5}">
-                      <a16:colId xmlns:a16="http://schemas.microsoft.com/office/drawing/2014/main" xmlns="" val="301441068"/>
+                      <a16:colId xmlns="" xmlns:a16="http://schemas.microsoft.com/office/drawing/2014/main" val="301441068"/>
                     </a:ext>
                   </a:extLst>
                 </a:gridCol>
@@ -13695,7 +13711,7 @@
                 </a:tc>
                 <a:extLst>
                   <a:ext uri="{0D108BD9-81ED-4DB2-BD59-A6C34878D82A}">
-                    <a16:rowId xmlns:a16="http://schemas.microsoft.com/office/drawing/2014/main" xmlns="" val="1677847784"/>
+                    <a16:rowId xmlns="" xmlns:a16="http://schemas.microsoft.com/office/drawing/2014/main" val="1677847784"/>
                   </a:ext>
                 </a:extLst>
               </a:tr>
@@ -13760,7 +13776,7 @@
                 </a:tc>
                 <a:extLst>
                   <a:ext uri="{0D108BD9-81ED-4DB2-BD59-A6C34878D82A}">
-                    <a16:rowId xmlns:a16="http://schemas.microsoft.com/office/drawing/2014/main" xmlns="" val="1475776976"/>
+                    <a16:rowId xmlns="" xmlns:a16="http://schemas.microsoft.com/office/drawing/2014/main" val="1475776976"/>
                   </a:ext>
                 </a:extLst>
               </a:tr>
@@ -13825,7 +13841,7 @@
                 </a:tc>
                 <a:extLst>
                   <a:ext uri="{0D108BD9-81ED-4DB2-BD59-A6C34878D82A}">
-                    <a16:rowId xmlns:a16="http://schemas.microsoft.com/office/drawing/2014/main" xmlns="" val="2539771682"/>
+                    <a16:rowId xmlns="" xmlns:a16="http://schemas.microsoft.com/office/drawing/2014/main" val="2539771682"/>
                   </a:ext>
                 </a:extLst>
               </a:tr>
@@ -13890,7 +13906,7 @@
                 </a:tc>
                 <a:extLst>
                   <a:ext uri="{0D108BD9-81ED-4DB2-BD59-A6C34878D82A}">
-                    <a16:rowId xmlns:a16="http://schemas.microsoft.com/office/drawing/2014/main" xmlns="" val="533620317"/>
+                    <a16:rowId xmlns="" xmlns:a16="http://schemas.microsoft.com/office/drawing/2014/main" val="533620317"/>
                   </a:ext>
                 </a:extLst>
               </a:tr>
@@ -13955,7 +13971,7 @@
                 </a:tc>
                 <a:extLst>
                   <a:ext uri="{0D108BD9-81ED-4DB2-BD59-A6C34878D82A}">
-                    <a16:rowId xmlns:a16="http://schemas.microsoft.com/office/drawing/2014/main" xmlns="" val="3605234754"/>
+                    <a16:rowId xmlns="" xmlns:a16="http://schemas.microsoft.com/office/drawing/2014/main" val="3605234754"/>
                   </a:ext>
                 </a:extLst>
               </a:tr>
@@ -14020,7 +14036,7 @@
                 </a:tc>
                 <a:extLst>
                   <a:ext uri="{0D108BD9-81ED-4DB2-BD59-A6C34878D82A}">
-                    <a16:rowId xmlns:a16="http://schemas.microsoft.com/office/drawing/2014/main" xmlns="" val="2215012867"/>
+                    <a16:rowId xmlns="" xmlns:a16="http://schemas.microsoft.com/office/drawing/2014/main" val="2215012867"/>
                   </a:ext>
                 </a:extLst>
               </a:tr>
@@ -14085,7 +14101,7 @@
                 </a:tc>
                 <a:extLst>
                   <a:ext uri="{0D108BD9-81ED-4DB2-BD59-A6C34878D82A}">
-                    <a16:rowId xmlns:a16="http://schemas.microsoft.com/office/drawing/2014/main" xmlns="" val="4269351208"/>
+                    <a16:rowId xmlns="" xmlns:a16="http://schemas.microsoft.com/office/drawing/2014/main" val="4269351208"/>
                   </a:ext>
                 </a:extLst>
               </a:tr>
@@ -14162,7 +14178,7 @@
                 </a:tc>
                 <a:extLst>
                   <a:ext uri="{0D108BD9-81ED-4DB2-BD59-A6C34878D82A}">
-                    <a16:rowId xmlns:a16="http://schemas.microsoft.com/office/drawing/2014/main" xmlns="" val="4042263983"/>
+                    <a16:rowId xmlns="" xmlns:a16="http://schemas.microsoft.com/office/drawing/2014/main" val="4042263983"/>
                   </a:ext>
                 </a:extLst>
               </a:tr>
@@ -14256,14 +14272,14 @@
                 <a:gridCol w="2271689">
                   <a:extLst>
                     <a:ext uri="{9D8B030D-6E8A-4147-A177-3AD203B41FA5}">
-                      <a16:colId xmlns:a16="http://schemas.microsoft.com/office/drawing/2014/main" xmlns="" val="1783178198"/>
+                      <a16:colId xmlns="" xmlns:a16="http://schemas.microsoft.com/office/drawing/2014/main" val="1783178198"/>
                     </a:ext>
                   </a:extLst>
                 </a:gridCol>
                 <a:gridCol w="6590209">
                   <a:extLst>
                     <a:ext uri="{9D8B030D-6E8A-4147-A177-3AD203B41FA5}">
-                      <a16:colId xmlns:a16="http://schemas.microsoft.com/office/drawing/2014/main" xmlns="" val="4069196069"/>
+                      <a16:colId xmlns="" xmlns:a16="http://schemas.microsoft.com/office/drawing/2014/main" val="4069196069"/>
                     </a:ext>
                   </a:extLst>
                 </a:gridCol>
@@ -14348,7 +14364,7 @@
                 </a:tc>
                 <a:extLst>
                   <a:ext uri="{0D108BD9-81ED-4DB2-BD59-A6C34878D82A}">
-                    <a16:rowId xmlns:a16="http://schemas.microsoft.com/office/drawing/2014/main" xmlns="" val="440690954"/>
+                    <a16:rowId xmlns="" xmlns:a16="http://schemas.microsoft.com/office/drawing/2014/main" val="440690954"/>
                   </a:ext>
                 </a:extLst>
               </a:tr>
@@ -14413,7 +14429,7 @@
                 </a:tc>
                 <a:extLst>
                   <a:ext uri="{0D108BD9-81ED-4DB2-BD59-A6C34878D82A}">
-                    <a16:rowId xmlns:a16="http://schemas.microsoft.com/office/drawing/2014/main" xmlns="" val="2244733657"/>
+                    <a16:rowId xmlns="" xmlns:a16="http://schemas.microsoft.com/office/drawing/2014/main" val="2244733657"/>
                   </a:ext>
                 </a:extLst>
               </a:tr>
@@ -14478,7 +14494,7 @@
                 </a:tc>
                 <a:extLst>
                   <a:ext uri="{0D108BD9-81ED-4DB2-BD59-A6C34878D82A}">
-                    <a16:rowId xmlns:a16="http://schemas.microsoft.com/office/drawing/2014/main" xmlns="" val="850045073"/>
+                    <a16:rowId xmlns="" xmlns:a16="http://schemas.microsoft.com/office/drawing/2014/main" val="850045073"/>
                   </a:ext>
                 </a:extLst>
               </a:tr>
@@ -14543,7 +14559,7 @@
                 </a:tc>
                 <a:extLst>
                   <a:ext uri="{0D108BD9-81ED-4DB2-BD59-A6C34878D82A}">
-                    <a16:rowId xmlns:a16="http://schemas.microsoft.com/office/drawing/2014/main" xmlns="" val="690867876"/>
+                    <a16:rowId xmlns="" xmlns:a16="http://schemas.microsoft.com/office/drawing/2014/main" val="690867876"/>
                   </a:ext>
                 </a:extLst>
               </a:tr>
@@ -14608,7 +14624,7 @@
                 </a:tc>
                 <a:extLst>
                   <a:ext uri="{0D108BD9-81ED-4DB2-BD59-A6C34878D82A}">
-                    <a16:rowId xmlns:a16="http://schemas.microsoft.com/office/drawing/2014/main" xmlns="" val="3081896387"/>
+                    <a16:rowId xmlns="" xmlns:a16="http://schemas.microsoft.com/office/drawing/2014/main" val="3081896387"/>
                   </a:ext>
                 </a:extLst>
               </a:tr>
@@ -14673,7 +14689,7 @@
                 </a:tc>
                 <a:extLst>
                   <a:ext uri="{0D108BD9-81ED-4DB2-BD59-A6C34878D82A}">
-                    <a16:rowId xmlns:a16="http://schemas.microsoft.com/office/drawing/2014/main" xmlns="" val="1407143264"/>
+                    <a16:rowId xmlns="" xmlns:a16="http://schemas.microsoft.com/office/drawing/2014/main" val="1407143264"/>
                   </a:ext>
                 </a:extLst>
               </a:tr>
@@ -14738,7 +14754,7 @@
                 </a:tc>
                 <a:extLst>
                   <a:ext uri="{0D108BD9-81ED-4DB2-BD59-A6C34878D82A}">
-                    <a16:rowId xmlns:a16="http://schemas.microsoft.com/office/drawing/2014/main" xmlns="" val="3076644184"/>
+                    <a16:rowId xmlns="" xmlns:a16="http://schemas.microsoft.com/office/drawing/2014/main" val="3076644184"/>
                   </a:ext>
                 </a:extLst>
               </a:tr>
@@ -14803,7 +14819,7 @@
                 </a:tc>
                 <a:extLst>
                   <a:ext uri="{0D108BD9-81ED-4DB2-BD59-A6C34878D82A}">
-                    <a16:rowId xmlns:a16="http://schemas.microsoft.com/office/drawing/2014/main" xmlns="" val="1661970842"/>
+                    <a16:rowId xmlns="" xmlns:a16="http://schemas.microsoft.com/office/drawing/2014/main" val="1661970842"/>
                   </a:ext>
                 </a:extLst>
               </a:tr>
@@ -14868,7 +14884,7 @@
                 </a:tc>
                 <a:extLst>
                   <a:ext uri="{0D108BD9-81ED-4DB2-BD59-A6C34878D82A}">
-                    <a16:rowId xmlns:a16="http://schemas.microsoft.com/office/drawing/2014/main" xmlns="" val="314694514"/>
+                    <a16:rowId xmlns="" xmlns:a16="http://schemas.microsoft.com/office/drawing/2014/main" val="314694514"/>
                   </a:ext>
                 </a:extLst>
               </a:tr>
@@ -16142,6 +16158,306 @@
     <p:extLst>
       <p:ext uri="{BB962C8B-B14F-4D97-AF65-F5344CB8AC3E}">
         <p14:creationId xmlns:p14="http://schemas.microsoft.com/office/powerpoint/2010/main" val="676934549"/>
+      </p:ext>
+    </p:extLst>
+  </p:cSld>
+  <p:clrMapOvr>
+    <a:masterClrMapping/>
+  </p:clrMapOvr>
+</p:sld>
+</file>
+
+<file path=ppt/slides/slide23.xml><?xml version="1.0" encoding="utf-8"?>
+<p:sld xmlns:a="http://schemas.openxmlformats.org/drawingml/2006/main" xmlns:r="http://schemas.openxmlformats.org/officeDocument/2006/relationships" xmlns:p="http://schemas.openxmlformats.org/presentationml/2006/main">
+  <p:cSld>
+    <p:spTree>
+      <p:nvGrpSpPr>
+        <p:cNvPr id="1" name=""/>
+        <p:cNvGrpSpPr/>
+        <p:nvPr/>
+      </p:nvGrpSpPr>
+      <p:grpSpPr>
+        <a:xfrm>
+          <a:off x="0" y="0"/>
+          <a:ext cx="0" cy="0"/>
+          <a:chOff x="0" y="0"/>
+          <a:chExt cx="0" cy="0"/>
+        </a:xfrm>
+      </p:grpSpPr>
+      <p:pic>
+        <p:nvPicPr>
+          <p:cNvPr id="2" name="Imagen 1"/>
+          <p:cNvPicPr>
+            <a:picLocks noChangeAspect="1"/>
+          </p:cNvPicPr>
+          <p:nvPr/>
+        </p:nvPicPr>
+        <p:blipFill>
+          <a:blip r:embed="rId2">
+            <a:extLst>
+              <a:ext uri="{28A0092B-C50C-407E-A947-70E740481C1C}">
+                <a14:useLocalDpi xmlns:a14="http://schemas.microsoft.com/office/drawing/2010/main" val="0"/>
+              </a:ext>
+            </a:extLst>
+          </a:blip>
+          <a:stretch>
+            <a:fillRect/>
+          </a:stretch>
+        </p:blipFill>
+        <p:spPr>
+          <a:xfrm>
+            <a:off x="2031999" y="223792"/>
+            <a:ext cx="7784329" cy="6445521"/>
+          </a:xfrm>
+          <a:prstGeom prst="rect">
+            <a:avLst/>
+          </a:prstGeom>
+        </p:spPr>
+      </p:pic>
+    </p:spTree>
+    <p:extLst>
+      <p:ext uri="{BB962C8B-B14F-4D97-AF65-F5344CB8AC3E}">
+        <p14:creationId xmlns:p14="http://schemas.microsoft.com/office/powerpoint/2010/main" val="1319618832"/>
+      </p:ext>
+    </p:extLst>
+  </p:cSld>
+  <p:clrMapOvr>
+    <a:masterClrMapping/>
+  </p:clrMapOvr>
+</p:sld>
+</file>
+
+<file path=ppt/slides/slide24.xml><?xml version="1.0" encoding="utf-8"?>
+<p:sld xmlns:a="http://schemas.openxmlformats.org/drawingml/2006/main" xmlns:r="http://schemas.openxmlformats.org/officeDocument/2006/relationships" xmlns:p="http://schemas.openxmlformats.org/presentationml/2006/main">
+  <p:cSld>
+    <p:spTree>
+      <p:nvGrpSpPr>
+        <p:cNvPr id="1" name=""/>
+        <p:cNvGrpSpPr/>
+        <p:nvPr/>
+      </p:nvGrpSpPr>
+      <p:grpSpPr>
+        <a:xfrm>
+          <a:off x="0" y="0"/>
+          <a:ext cx="0" cy="0"/>
+          <a:chOff x="0" y="0"/>
+          <a:chExt cx="0" cy="0"/>
+        </a:xfrm>
+      </p:grpSpPr>
+      <p:pic>
+        <p:nvPicPr>
+          <p:cNvPr id="3" name="Imagen 2"/>
+          <p:cNvPicPr>
+            <a:picLocks noChangeAspect="1"/>
+          </p:cNvPicPr>
+          <p:nvPr/>
+        </p:nvPicPr>
+        <p:blipFill>
+          <a:blip r:embed="rId2">
+            <a:extLst>
+              <a:ext uri="{28A0092B-C50C-407E-A947-70E740481C1C}">
+                <a14:useLocalDpi xmlns:a14="http://schemas.microsoft.com/office/drawing/2010/main" val="0"/>
+              </a:ext>
+            </a:extLst>
+          </a:blip>
+          <a:stretch>
+            <a:fillRect/>
+          </a:stretch>
+        </p:blipFill>
+        <p:spPr>
+          <a:xfrm>
+            <a:off x="2762250" y="528637"/>
+            <a:ext cx="6667500" cy="5800725"/>
+          </a:xfrm>
+          <a:prstGeom prst="rect">
+            <a:avLst/>
+          </a:prstGeom>
+        </p:spPr>
+      </p:pic>
+    </p:spTree>
+    <p:extLst>
+      <p:ext uri="{BB962C8B-B14F-4D97-AF65-F5344CB8AC3E}">
+        <p14:creationId xmlns:p14="http://schemas.microsoft.com/office/powerpoint/2010/main" val="977211566"/>
+      </p:ext>
+    </p:extLst>
+  </p:cSld>
+  <p:clrMapOvr>
+    <a:masterClrMapping/>
+  </p:clrMapOvr>
+</p:sld>
+</file>
+
+<file path=ppt/slides/slide25.xml><?xml version="1.0" encoding="utf-8"?>
+<p:sld xmlns:a="http://schemas.openxmlformats.org/drawingml/2006/main" xmlns:r="http://schemas.openxmlformats.org/officeDocument/2006/relationships" xmlns:p="http://schemas.openxmlformats.org/presentationml/2006/main">
+  <p:cSld>
+    <p:spTree>
+      <p:nvGrpSpPr>
+        <p:cNvPr id="1" name=""/>
+        <p:cNvGrpSpPr/>
+        <p:nvPr/>
+      </p:nvGrpSpPr>
+      <p:grpSpPr>
+        <a:xfrm>
+          <a:off x="0" y="0"/>
+          <a:ext cx="0" cy="0"/>
+          <a:chOff x="0" y="0"/>
+          <a:chExt cx="0" cy="0"/>
+        </a:xfrm>
+      </p:grpSpPr>
+      <p:pic>
+        <p:nvPicPr>
+          <p:cNvPr id="2" name="Imagen 1"/>
+          <p:cNvPicPr>
+            <a:picLocks noChangeAspect="1"/>
+          </p:cNvPicPr>
+          <p:nvPr/>
+        </p:nvPicPr>
+        <p:blipFill>
+          <a:blip r:embed="rId2">
+            <a:extLst>
+              <a:ext uri="{28A0092B-C50C-407E-A947-70E740481C1C}">
+                <a14:useLocalDpi xmlns:a14="http://schemas.microsoft.com/office/drawing/2010/main" val="0"/>
+              </a:ext>
+            </a:extLst>
+          </a:blip>
+          <a:stretch>
+            <a:fillRect/>
+          </a:stretch>
+        </p:blipFill>
+        <p:spPr>
+          <a:xfrm>
+            <a:off x="1362872" y="1277257"/>
+            <a:ext cx="9803132" cy="3585029"/>
+          </a:xfrm>
+          <a:prstGeom prst="rect">
+            <a:avLst/>
+          </a:prstGeom>
+        </p:spPr>
+      </p:pic>
+    </p:spTree>
+    <p:extLst>
+      <p:ext uri="{BB962C8B-B14F-4D97-AF65-F5344CB8AC3E}">
+        <p14:creationId xmlns:p14="http://schemas.microsoft.com/office/powerpoint/2010/main" val="3931547339"/>
+      </p:ext>
+    </p:extLst>
+  </p:cSld>
+  <p:clrMapOvr>
+    <a:masterClrMapping/>
+  </p:clrMapOvr>
+</p:sld>
+</file>
+
+<file path=ppt/slides/slide26.xml><?xml version="1.0" encoding="utf-8"?>
+<p:sld xmlns:a="http://schemas.openxmlformats.org/drawingml/2006/main" xmlns:r="http://schemas.openxmlformats.org/officeDocument/2006/relationships" xmlns:p="http://schemas.openxmlformats.org/presentationml/2006/main">
+  <p:cSld>
+    <p:spTree>
+      <p:nvGrpSpPr>
+        <p:cNvPr id="1" name=""/>
+        <p:cNvGrpSpPr/>
+        <p:nvPr/>
+      </p:nvGrpSpPr>
+      <p:grpSpPr>
+        <a:xfrm>
+          <a:off x="0" y="0"/>
+          <a:ext cx="0" cy="0"/>
+          <a:chOff x="0" y="0"/>
+          <a:chExt cx="0" cy="0"/>
+        </a:xfrm>
+      </p:grpSpPr>
+      <p:pic>
+        <p:nvPicPr>
+          <p:cNvPr id="3" name="Imagen 2"/>
+          <p:cNvPicPr>
+            <a:picLocks noChangeAspect="1"/>
+          </p:cNvPicPr>
+          <p:nvPr/>
+        </p:nvPicPr>
+        <p:blipFill>
+          <a:blip r:embed="rId2">
+            <a:extLst>
+              <a:ext uri="{28A0092B-C50C-407E-A947-70E740481C1C}">
+                <a14:useLocalDpi xmlns:a14="http://schemas.microsoft.com/office/drawing/2010/main" val="0"/>
+              </a:ext>
+            </a:extLst>
+          </a:blip>
+          <a:stretch>
+            <a:fillRect/>
+          </a:stretch>
+        </p:blipFill>
+        <p:spPr>
+          <a:xfrm>
+            <a:off x="1097189" y="725940"/>
+            <a:ext cx="10107840" cy="5049296"/>
+          </a:xfrm>
+          <a:prstGeom prst="rect">
+            <a:avLst/>
+          </a:prstGeom>
+        </p:spPr>
+      </p:pic>
+    </p:spTree>
+    <p:extLst>
+      <p:ext uri="{BB962C8B-B14F-4D97-AF65-F5344CB8AC3E}">
+        <p14:creationId xmlns:p14="http://schemas.microsoft.com/office/powerpoint/2010/main" val="962336910"/>
+      </p:ext>
+    </p:extLst>
+  </p:cSld>
+  <p:clrMapOvr>
+    <a:masterClrMapping/>
+  </p:clrMapOvr>
+</p:sld>
+</file>
+
+<file path=ppt/slides/slide27.xml><?xml version="1.0" encoding="utf-8"?>
+<p:sld xmlns:a="http://schemas.openxmlformats.org/drawingml/2006/main" xmlns:r="http://schemas.openxmlformats.org/officeDocument/2006/relationships" xmlns:p="http://schemas.openxmlformats.org/presentationml/2006/main">
+  <p:cSld>
+    <p:spTree>
+      <p:nvGrpSpPr>
+        <p:cNvPr id="1" name=""/>
+        <p:cNvGrpSpPr/>
+        <p:nvPr/>
+      </p:nvGrpSpPr>
+      <p:grpSpPr>
+        <a:xfrm>
+          <a:off x="0" y="0"/>
+          <a:ext cx="0" cy="0"/>
+          <a:chOff x="0" y="0"/>
+          <a:chExt cx="0" cy="0"/>
+        </a:xfrm>
+      </p:grpSpPr>
+      <p:pic>
+        <p:nvPicPr>
+          <p:cNvPr id="2" name="Imagen 1"/>
+          <p:cNvPicPr>
+            <a:picLocks noChangeAspect="1"/>
+          </p:cNvPicPr>
+          <p:nvPr/>
+        </p:nvPicPr>
+        <p:blipFill>
+          <a:blip r:embed="rId2">
+            <a:extLst>
+              <a:ext uri="{28A0092B-C50C-407E-A947-70E740481C1C}">
+                <a14:useLocalDpi xmlns:a14="http://schemas.microsoft.com/office/drawing/2010/main" val="0"/>
+              </a:ext>
+            </a:extLst>
+          </a:blip>
+          <a:stretch>
+            <a:fillRect/>
+          </a:stretch>
+        </p:blipFill>
+        <p:spPr>
+          <a:xfrm>
+            <a:off x="1226455" y="899885"/>
+            <a:ext cx="9898744" cy="4949372"/>
+          </a:xfrm>
+          <a:prstGeom prst="rect">
+            <a:avLst/>
+          </a:prstGeom>
+        </p:spPr>
+      </p:pic>
+    </p:spTree>
+    <p:extLst>
+      <p:ext uri="{BB962C8B-B14F-4D97-AF65-F5344CB8AC3E}">
+        <p14:creationId xmlns:p14="http://schemas.microsoft.com/office/powerpoint/2010/main" val="2713877749"/>
       </p:ext>
     </p:extLst>
   </p:cSld>
@@ -17124,7 +17440,7 @@
   <a:extraClrSchemeLst/>
   <a:extLst>
     <a:ext uri="{05A4C25C-085E-4340-85A3-A5531E510DB2}">
-      <thm15:themeFamily xmlns:thm15="http://schemas.microsoft.com/office/thememl/2012/main" xmlns="" name="Circuit" id="{0AC2F7E7-15F5-431C-B2A2-456FE929F56C}" vid="{0911B802-464C-4241-8DD9-B60FF88E379F}"/>
+      <thm15:themeFamily xmlns:thm15="http://schemas.microsoft.com/office/thememl/2012/main" name="Circuit" id="{0AC2F7E7-15F5-431C-B2A2-456FE929F56C}" vid="{0911B802-464C-4241-8DD9-B60FF88E379F}"/>
     </a:ext>
   </a:extLst>
 </a:theme>

</xml_diff>